<commit_message>
Update TODO to reflect actual implementation status and add text styling builder methods
- Mark advanced content features as partial completion in TODO
- Document working features: font sizing (8-96pt), bold formatting
- Document defined but unimplemented features: italic, underline, colors, tables, images
- Add detailed time estimates for implementing remaining features
- Break down high priority tasks: text styling (2-3h), tables (4-6h), images (3-4h), charts (5-7h)
- Add italic, underline, and color builder
</commit_message>
<xml_diff>
--- a/examples/output/business_presentation.pptx
+++ b/examples/output/business_presentation.pptx
@@ -118,7 +118,7 @@
           <a:lstStyle/>
           <a:p>
             <a:r>
-              <a:rPr lang="en-US" sz="4400" b="1"/>
+              <a:rPr lang="en-US" sz="4400" b="1" i="0"/>
               <a:t>Business Overview</a:t>
             </a:r>
           </a:p>
@@ -150,21 +150,21 @@
           <a:p>
             <a:pPr lvl="0"/>
             <a:r>
-              <a:rPr lang="en-US" sz="2800"/>
+              <a:rPr lang="en-US" sz="2800" b="0" i="0"/>
               <a:t>Company mission and vision</a:t>
             </a:r>
           </a:p>
           <a:p>
             <a:pPr lvl="0"/>
             <a:r>
-              <a:rPr lang="en-US" sz="2800"/>
+              <a:rPr lang="en-US" sz="2800" b="0" i="0"/>
               <a:t>Market position</a:t>
             </a:r>
           </a:p>
           <a:p>
             <a:pPr lvl="0"/>
             <a:r>
-              <a:rPr lang="en-US" sz="2800"/>
+              <a:rPr lang="en-US" sz="2800" b="0" i="0"/>
               <a:t>Strategic goals</a:t>
             </a:r>
           </a:p>
@@ -225,7 +225,7 @@
           <a:lstStyle/>
           <a:p>
             <a:r>
-              <a:rPr lang="en-US" sz="4400" b="1"/>
+              <a:rPr lang="en-US" sz="4400" b="1" i="0"/>
               <a:t>Q1 2025 Results</a:t>
             </a:r>
           </a:p>
@@ -257,21 +257,21 @@
           <a:p>
             <a:pPr lvl="0"/>
             <a:r>
-              <a:rPr lang="en-US" sz="2800"/>
+              <a:rPr lang="en-US" sz="2800" b="0" i="0"/>
               <a:t>Revenue: $2.5M (+15% YoY)</a:t>
             </a:r>
           </a:p>
           <a:p>
             <a:pPr lvl="0"/>
             <a:r>
-              <a:rPr lang="en-US" sz="2800"/>
+              <a:rPr lang="en-US" sz="2800" b="0" i="0"/>
               <a:t>Customer acquisition: 250 new clients</a:t>
             </a:r>
           </a:p>
           <a:p>
             <a:pPr lvl="0"/>
             <a:r>
-              <a:rPr lang="en-US" sz="2800"/>
+              <a:rPr lang="en-US" sz="2800" b="0" i="0"/>
               <a:t>Market share increased to 12%</a:t>
             </a:r>
           </a:p>
@@ -332,7 +332,7 @@
           <a:lstStyle/>
           <a:p>
             <a:r>
-              <a:rPr lang="en-US" sz="4400" b="1"/>
+              <a:rPr lang="en-US" sz="4400" b="1" i="0"/>
               <a:t>Key Initiatives</a:t>
             </a:r>
           </a:p>
@@ -364,21 +364,21 @@
           <a:p>
             <a:pPr lvl="0"/>
             <a:r>
-              <a:rPr lang="en-US" sz="2800"/>
+              <a:rPr lang="en-US" sz="2800" b="0" i="0"/>
               <a:t>Product roadmap expansion</a:t>
             </a:r>
           </a:p>
           <a:p>
             <a:pPr lvl="0"/>
             <a:r>
-              <a:rPr lang="en-US" sz="2800"/>
+              <a:rPr lang="en-US" sz="2800" b="0" i="0"/>
               <a:t>Team growth and hiring</a:t>
             </a:r>
           </a:p>
           <a:p>
             <a:pPr lvl="0"/>
             <a:r>
-              <a:rPr lang="en-US" sz="2800"/>
+              <a:rPr lang="en-US" sz="2800" b="0" i="0"/>
               <a:t>International market entry</a:t>
             </a:r>
           </a:p>
@@ -439,7 +439,7 @@
           <a:lstStyle/>
           <a:p>
             <a:r>
-              <a:rPr lang="en-US" sz="4400" b="1"/>
+              <a:rPr lang="en-US" sz="4400" b="1" i="0"/>
               <a:t>Financial Projections</a:t>
             </a:r>
           </a:p>
@@ -471,21 +471,21 @@
           <a:p>
             <a:pPr lvl="0"/>
             <a:r>
-              <a:rPr lang="en-US" sz="2800"/>
+              <a:rPr lang="en-US" sz="2800" b="0" i="0"/>
               <a:t>Q2 target: $2.8M revenue</a:t>
             </a:r>
           </a:p>
           <a:p>
             <a:pPr lvl="0"/>
             <a:r>
-              <a:rPr lang="en-US" sz="2800"/>
+              <a:rPr lang="en-US" sz="2800" b="0" i="0"/>
               <a:t>Expected 20% growth</a:t>
             </a:r>
           </a:p>
           <a:p>
             <a:pPr lvl="0"/>
             <a:r>
-              <a:rPr lang="en-US" sz="2800"/>
+              <a:rPr lang="en-US" sz="2800" b="0" i="0"/>
               <a:t>Break-even by Q3</a:t>
             </a:r>
           </a:p>

</xml_diff>